<commit_message>
Simple binary tree code corrected!
</commit_message>
<xml_diff>
--- a/Week 9 (Nov. 10th, trees)/INFO 3135 Week Trees.pptx
+++ b/Week 9 (Nov. 10th, trees)/INFO 3135 Week Trees.pptx
@@ -132,7 +132,18 @@
   </p:defaultTextStyle>
   <p:extLst>
     <p:ext uri="{EFAFB233-063F-42B5-8137-9DF3F51BA10A}">
-      <p15:sldGuideLst xmlns:p15="http://schemas.microsoft.com/office/powerpoint/2012/main" xmlns=""/>
+      <p15:sldGuideLst xmlns:p15="http://schemas.microsoft.com/office/powerpoint/2012/main">
+        <p15:guide id="1" orient="horz" pos="2160">
+          <p15:clr>
+            <a:srgbClr val="A4A3A4"/>
+          </p15:clr>
+        </p15:guide>
+        <p15:guide id="2" pos="3840">
+          <p15:clr>
+            <a:srgbClr val="A4A3A4"/>
+          </p15:clr>
+        </p15:guide>
+      </p15:sldGuideLst>
     </p:ext>
   </p:extLst>
 </p:presentation>
@@ -390,7 +401,7 @@
     </p:spTree>
     <p:extLst>
       <p:ext uri="{BB962C8B-B14F-4D97-AF65-F5344CB8AC3E}">
-        <p14:creationId xmlns:p14="http://schemas.microsoft.com/office/powerpoint/2010/main" xmlns="" val="3838543124"/>
+        <p14:creationId xmlns:p14="http://schemas.microsoft.com/office/powerpoint/2010/main" val="3838543124"/>
       </p:ext>
     </p:extLst>
   </p:cSld>
@@ -565,7 +576,7 @@
     </p:spTree>
     <p:extLst>
       <p:ext uri="{BB962C8B-B14F-4D97-AF65-F5344CB8AC3E}">
-        <p14:creationId xmlns:p14="http://schemas.microsoft.com/office/powerpoint/2010/main" xmlns="" val="1717598006"/>
+        <p14:creationId xmlns:p14="http://schemas.microsoft.com/office/powerpoint/2010/main" val="1717598006"/>
       </p:ext>
     </p:extLst>
   </p:cSld>
@@ -759,7 +770,7 @@
     </p:spTree>
     <p:extLst>
       <p:ext uri="{BB962C8B-B14F-4D97-AF65-F5344CB8AC3E}">
-        <p14:creationId xmlns:p14="http://schemas.microsoft.com/office/powerpoint/2010/main" xmlns="" val="2077059326"/>
+        <p14:creationId xmlns:p14="http://schemas.microsoft.com/office/powerpoint/2010/main" val="2077059326"/>
       </p:ext>
     </p:extLst>
   </p:cSld>
@@ -931,7 +942,7 @@
     </p:spTree>
     <p:extLst>
       <p:ext uri="{BB962C8B-B14F-4D97-AF65-F5344CB8AC3E}">
-        <p14:creationId xmlns:p14="http://schemas.microsoft.com/office/powerpoint/2010/main" xmlns="" val="4179238904"/>
+        <p14:creationId xmlns:p14="http://schemas.microsoft.com/office/powerpoint/2010/main" val="4179238904"/>
       </p:ext>
     </p:extLst>
   </p:cSld>
@@ -1113,7 +1124,7 @@
     </p:spTree>
     <p:extLst>
       <p:ext uri="{BB962C8B-B14F-4D97-AF65-F5344CB8AC3E}">
-        <p14:creationId xmlns:p14="http://schemas.microsoft.com/office/powerpoint/2010/main" xmlns="" val="3697055811"/>
+        <p14:creationId xmlns:p14="http://schemas.microsoft.com/office/powerpoint/2010/main" val="3697055811"/>
       </p:ext>
     </p:extLst>
   </p:cSld>
@@ -1285,7 +1296,7 @@
     </p:spTree>
     <p:extLst>
       <p:ext uri="{BB962C8B-B14F-4D97-AF65-F5344CB8AC3E}">
-        <p14:creationId xmlns:p14="http://schemas.microsoft.com/office/powerpoint/2010/main" xmlns="" val="2963017691"/>
+        <p14:creationId xmlns:p14="http://schemas.microsoft.com/office/powerpoint/2010/main" val="2963017691"/>
       </p:ext>
     </p:extLst>
   </p:cSld>
@@ -1533,7 +1544,7 @@
     </p:spTree>
     <p:extLst>
       <p:ext uri="{BB962C8B-B14F-4D97-AF65-F5344CB8AC3E}">
-        <p14:creationId xmlns:p14="http://schemas.microsoft.com/office/powerpoint/2010/main" xmlns="" val="1255086877"/>
+        <p14:creationId xmlns:p14="http://schemas.microsoft.com/office/powerpoint/2010/main" val="1255086877"/>
       </p:ext>
     </p:extLst>
   </p:cSld>
@@ -1767,7 +1778,7 @@
     </p:spTree>
     <p:extLst>
       <p:ext uri="{BB962C8B-B14F-4D97-AF65-F5344CB8AC3E}">
-        <p14:creationId xmlns:p14="http://schemas.microsoft.com/office/powerpoint/2010/main" xmlns="" val="3034710184"/>
+        <p14:creationId xmlns:p14="http://schemas.microsoft.com/office/powerpoint/2010/main" val="3034710184"/>
       </p:ext>
     </p:extLst>
   </p:cSld>
@@ -2136,7 +2147,7 @@
     </p:spTree>
     <p:extLst>
       <p:ext uri="{BB962C8B-B14F-4D97-AF65-F5344CB8AC3E}">
-        <p14:creationId xmlns:p14="http://schemas.microsoft.com/office/powerpoint/2010/main" xmlns="" val="3894773758"/>
+        <p14:creationId xmlns:p14="http://schemas.microsoft.com/office/powerpoint/2010/main" val="3894773758"/>
       </p:ext>
     </p:extLst>
   </p:cSld>
@@ -2256,7 +2267,7 @@
     </p:spTree>
     <p:extLst>
       <p:ext uri="{BB962C8B-B14F-4D97-AF65-F5344CB8AC3E}">
-        <p14:creationId xmlns:p14="http://schemas.microsoft.com/office/powerpoint/2010/main" xmlns="" val="1678366413"/>
+        <p14:creationId xmlns:p14="http://schemas.microsoft.com/office/powerpoint/2010/main" val="1678366413"/>
       </p:ext>
     </p:extLst>
   </p:cSld>
@@ -2353,7 +2364,7 @@
     </p:spTree>
     <p:extLst>
       <p:ext uri="{BB962C8B-B14F-4D97-AF65-F5344CB8AC3E}">
-        <p14:creationId xmlns:p14="http://schemas.microsoft.com/office/powerpoint/2010/main" xmlns="" val="4280413222"/>
+        <p14:creationId xmlns:p14="http://schemas.microsoft.com/office/powerpoint/2010/main" val="4280413222"/>
       </p:ext>
     </p:extLst>
   </p:cSld>
@@ -2632,7 +2643,7 @@
     </p:spTree>
     <p:extLst>
       <p:ext uri="{BB962C8B-B14F-4D97-AF65-F5344CB8AC3E}">
-        <p14:creationId xmlns:p14="http://schemas.microsoft.com/office/powerpoint/2010/main" xmlns="" val="3439465259"/>
+        <p14:creationId xmlns:p14="http://schemas.microsoft.com/office/powerpoint/2010/main" val="3439465259"/>
       </p:ext>
     </p:extLst>
   </p:cSld>
@@ -2887,7 +2898,7 @@
     </p:spTree>
     <p:extLst>
       <p:ext uri="{BB962C8B-B14F-4D97-AF65-F5344CB8AC3E}">
-        <p14:creationId xmlns:p14="http://schemas.microsoft.com/office/powerpoint/2010/main" xmlns="" val="1493598593"/>
+        <p14:creationId xmlns:p14="http://schemas.microsoft.com/office/powerpoint/2010/main" val="1493598593"/>
       </p:ext>
     </p:extLst>
   </p:cSld>
@@ -3147,7 +3158,7 @@
     </p:spTree>
     <p:extLst>
       <p:ext uri="{BB962C8B-B14F-4D97-AF65-F5344CB8AC3E}">
-        <p14:creationId xmlns:p14="http://schemas.microsoft.com/office/powerpoint/2010/main" xmlns="" val="1771977269"/>
+        <p14:creationId xmlns:p14="http://schemas.microsoft.com/office/powerpoint/2010/main" val="1771977269"/>
       </p:ext>
     </p:extLst>
   </p:cSld>
@@ -3562,7 +3573,7 @@
     </p:spTree>
     <p:extLst>
       <p:ext uri="{BB962C8B-B14F-4D97-AF65-F5344CB8AC3E}">
-        <p14:creationId xmlns:p14="http://schemas.microsoft.com/office/powerpoint/2010/main" xmlns="" val="15809616"/>
+        <p14:creationId xmlns:p14="http://schemas.microsoft.com/office/powerpoint/2010/main" val="15809616"/>
       </p:ext>
     </p:extLst>
   </p:cSld>
@@ -3668,7 +3679,7 @@
           <p:cNvPr id="4" name="Oval 3">
             <a:extLst>
               <a:ext uri="{FF2B5EF4-FFF2-40B4-BE49-F238E27FC236}">
-                <a16:creationId xmlns:a16="http://schemas.microsoft.com/office/drawing/2014/main" xmlns="" id="{E473EA00-5655-419F-8677-E399EB10504A}"/>
+                <a16:creationId xmlns:a16="http://schemas.microsoft.com/office/drawing/2014/main" id="{E473EA00-5655-419F-8677-E399EB10504A}"/>
               </a:ext>
             </a:extLst>
           </p:cNvPr>
@@ -3720,7 +3731,7 @@
           <p:cNvPr id="5" name="Oval 4">
             <a:extLst>
               <a:ext uri="{FF2B5EF4-FFF2-40B4-BE49-F238E27FC236}">
-                <a16:creationId xmlns:a16="http://schemas.microsoft.com/office/drawing/2014/main" xmlns="" id="{C71F7F7D-F885-48F8-A097-967E8AD9F9DE}"/>
+                <a16:creationId xmlns:a16="http://schemas.microsoft.com/office/drawing/2014/main" id="{C71F7F7D-F885-48F8-A097-967E8AD9F9DE}"/>
               </a:ext>
             </a:extLst>
           </p:cNvPr>
@@ -3769,7 +3780,7 @@
           <p:cNvPr id="6" name="Oval 5">
             <a:extLst>
               <a:ext uri="{FF2B5EF4-FFF2-40B4-BE49-F238E27FC236}">
-                <a16:creationId xmlns:a16="http://schemas.microsoft.com/office/drawing/2014/main" xmlns="" id="{3C85495D-1278-4C81-97A6-4E8FDFFBF1B2}"/>
+                <a16:creationId xmlns:a16="http://schemas.microsoft.com/office/drawing/2014/main" id="{3C85495D-1278-4C81-97A6-4E8FDFFBF1B2}"/>
               </a:ext>
             </a:extLst>
           </p:cNvPr>
@@ -3818,7 +3829,7 @@
           <p:cNvPr id="7" name="Oval 6">
             <a:extLst>
               <a:ext uri="{FF2B5EF4-FFF2-40B4-BE49-F238E27FC236}">
-                <a16:creationId xmlns:a16="http://schemas.microsoft.com/office/drawing/2014/main" xmlns="" id="{DC30A7B2-1269-4F6D-87CF-C320DA8A861D}"/>
+                <a16:creationId xmlns:a16="http://schemas.microsoft.com/office/drawing/2014/main" id="{DC30A7B2-1269-4F6D-87CF-C320DA8A861D}"/>
               </a:ext>
             </a:extLst>
           </p:cNvPr>
@@ -3867,7 +3878,7 @@
           <p:cNvPr id="9" name="Straight Arrow Connector 8">
             <a:extLst>
               <a:ext uri="{FF2B5EF4-FFF2-40B4-BE49-F238E27FC236}">
-                <a16:creationId xmlns:a16="http://schemas.microsoft.com/office/drawing/2014/main" xmlns="" id="{A7CBA911-E6CC-4634-B494-6E7906683FCA}"/>
+                <a16:creationId xmlns:a16="http://schemas.microsoft.com/office/drawing/2014/main" id="{A7CBA911-E6CC-4634-B494-6E7906683FCA}"/>
               </a:ext>
             </a:extLst>
           </p:cNvPr>
@@ -3915,7 +3926,7 @@
           <p:cNvPr id="11" name="Straight Arrow Connector 10">
             <a:extLst>
               <a:ext uri="{FF2B5EF4-FFF2-40B4-BE49-F238E27FC236}">
-                <a16:creationId xmlns:a16="http://schemas.microsoft.com/office/drawing/2014/main" xmlns="" id="{BCEA0B69-48D6-462C-A840-9F4C11F26B36}"/>
+                <a16:creationId xmlns:a16="http://schemas.microsoft.com/office/drawing/2014/main" id="{BCEA0B69-48D6-462C-A840-9F4C11F26B36}"/>
               </a:ext>
             </a:extLst>
           </p:cNvPr>
@@ -3964,7 +3975,7 @@
           <p:cNvPr id="20" name="Straight Arrow Connector 19">
             <a:extLst>
               <a:ext uri="{FF2B5EF4-FFF2-40B4-BE49-F238E27FC236}">
-                <a16:creationId xmlns:a16="http://schemas.microsoft.com/office/drawing/2014/main" xmlns="" id="{181CCDE4-308E-457C-9A3F-BEA09134AC0C}"/>
+                <a16:creationId xmlns:a16="http://schemas.microsoft.com/office/drawing/2014/main" id="{181CCDE4-308E-457C-9A3F-BEA09134AC0C}"/>
               </a:ext>
             </a:extLst>
           </p:cNvPr>
@@ -4013,7 +4024,7 @@
           <p:cNvPr id="24" name="Arrow: Right 23">
             <a:extLst>
               <a:ext uri="{FF2B5EF4-FFF2-40B4-BE49-F238E27FC236}">
-                <a16:creationId xmlns:a16="http://schemas.microsoft.com/office/drawing/2014/main" xmlns="" id="{FE2C84DF-418B-421E-9A0E-D41E784044C2}"/>
+                <a16:creationId xmlns:a16="http://schemas.microsoft.com/office/drawing/2014/main" id="{FE2C84DF-418B-421E-9A0E-D41E784044C2}"/>
               </a:ext>
             </a:extLst>
           </p:cNvPr>
@@ -4062,7 +4073,7 @@
           <p:cNvPr id="26" name="Oval 25">
             <a:extLst>
               <a:ext uri="{FF2B5EF4-FFF2-40B4-BE49-F238E27FC236}">
-                <a16:creationId xmlns:a16="http://schemas.microsoft.com/office/drawing/2014/main" xmlns="" id="{27642018-BE8E-4F6E-B6C4-6EEF7D99D1DF}"/>
+                <a16:creationId xmlns:a16="http://schemas.microsoft.com/office/drawing/2014/main" id="{27642018-BE8E-4F6E-B6C4-6EEF7D99D1DF}"/>
               </a:ext>
             </a:extLst>
           </p:cNvPr>
@@ -4111,7 +4122,7 @@
           <p:cNvPr id="27" name="Oval 26">
             <a:extLst>
               <a:ext uri="{FF2B5EF4-FFF2-40B4-BE49-F238E27FC236}">
-                <a16:creationId xmlns:a16="http://schemas.microsoft.com/office/drawing/2014/main" xmlns="" id="{DA26290B-C6AC-451A-AC00-4D7EF615B4F9}"/>
+                <a16:creationId xmlns:a16="http://schemas.microsoft.com/office/drawing/2014/main" id="{DA26290B-C6AC-451A-AC00-4D7EF615B4F9}"/>
               </a:ext>
             </a:extLst>
           </p:cNvPr>
@@ -4160,7 +4171,7 @@
           <p:cNvPr id="28" name="Straight Arrow Connector 27">
             <a:extLst>
               <a:ext uri="{FF2B5EF4-FFF2-40B4-BE49-F238E27FC236}">
-                <a16:creationId xmlns:a16="http://schemas.microsoft.com/office/drawing/2014/main" xmlns="" id="{B7F0F867-7B3B-447C-805F-7B3FEBB40BA9}"/>
+                <a16:creationId xmlns:a16="http://schemas.microsoft.com/office/drawing/2014/main" id="{B7F0F867-7B3B-447C-805F-7B3FEBB40BA9}"/>
               </a:ext>
             </a:extLst>
           </p:cNvPr>
@@ -4209,7 +4220,7 @@
           <p:cNvPr id="29" name="Straight Arrow Connector 28">
             <a:extLst>
               <a:ext uri="{FF2B5EF4-FFF2-40B4-BE49-F238E27FC236}">
-                <a16:creationId xmlns:a16="http://schemas.microsoft.com/office/drawing/2014/main" xmlns="" id="{89F37F77-A290-4CB3-9561-D4AC9B1F1E01}"/>
+                <a16:creationId xmlns:a16="http://schemas.microsoft.com/office/drawing/2014/main" id="{89F37F77-A290-4CB3-9561-D4AC9B1F1E01}"/>
               </a:ext>
             </a:extLst>
           </p:cNvPr>
@@ -4258,7 +4269,7 @@
           <p:cNvPr id="35" name="Oval 34">
             <a:extLst>
               <a:ext uri="{FF2B5EF4-FFF2-40B4-BE49-F238E27FC236}">
-                <a16:creationId xmlns:a16="http://schemas.microsoft.com/office/drawing/2014/main" xmlns="" id="{587277B1-0E7E-4EDB-89C6-99AD1461FC03}"/>
+                <a16:creationId xmlns:a16="http://schemas.microsoft.com/office/drawing/2014/main" id="{587277B1-0E7E-4EDB-89C6-99AD1461FC03}"/>
               </a:ext>
             </a:extLst>
           </p:cNvPr>
@@ -4307,7 +4318,7 @@
           <p:cNvPr id="36" name="Straight Arrow Connector 35">
             <a:extLst>
               <a:ext uri="{FF2B5EF4-FFF2-40B4-BE49-F238E27FC236}">
-                <a16:creationId xmlns:a16="http://schemas.microsoft.com/office/drawing/2014/main" xmlns="" id="{BBE8472F-9E1A-4260-8C73-05CA12C53789}"/>
+                <a16:creationId xmlns:a16="http://schemas.microsoft.com/office/drawing/2014/main" id="{BBE8472F-9E1A-4260-8C73-05CA12C53789}"/>
               </a:ext>
             </a:extLst>
           </p:cNvPr>
@@ -4356,7 +4367,7 @@
           <p:cNvPr id="41" name="Oval 40">
             <a:extLst>
               <a:ext uri="{FF2B5EF4-FFF2-40B4-BE49-F238E27FC236}">
-                <a16:creationId xmlns:a16="http://schemas.microsoft.com/office/drawing/2014/main" xmlns="" id="{0D073356-B1E0-437C-A3B9-32B271178F6A}"/>
+                <a16:creationId xmlns:a16="http://schemas.microsoft.com/office/drawing/2014/main" id="{0D073356-B1E0-437C-A3B9-32B271178F6A}"/>
               </a:ext>
             </a:extLst>
           </p:cNvPr>
@@ -4405,7 +4416,7 @@
           <p:cNvPr id="42" name="Oval 41">
             <a:extLst>
               <a:ext uri="{FF2B5EF4-FFF2-40B4-BE49-F238E27FC236}">
-                <a16:creationId xmlns:a16="http://schemas.microsoft.com/office/drawing/2014/main" xmlns="" id="{042FB703-0471-4C51-AFFB-589662DF27E1}"/>
+                <a16:creationId xmlns:a16="http://schemas.microsoft.com/office/drawing/2014/main" id="{042FB703-0471-4C51-AFFB-589662DF27E1}"/>
               </a:ext>
             </a:extLst>
           </p:cNvPr>
@@ -4454,7 +4465,7 @@
           <p:cNvPr id="43" name="Oval 42">
             <a:extLst>
               <a:ext uri="{FF2B5EF4-FFF2-40B4-BE49-F238E27FC236}">
-                <a16:creationId xmlns:a16="http://schemas.microsoft.com/office/drawing/2014/main" xmlns="" id="{1EFB03DA-DA82-4440-AC34-ED06AD00D4AD}"/>
+                <a16:creationId xmlns:a16="http://schemas.microsoft.com/office/drawing/2014/main" id="{1EFB03DA-DA82-4440-AC34-ED06AD00D4AD}"/>
               </a:ext>
             </a:extLst>
           </p:cNvPr>
@@ -4506,7 +4517,7 @@
           <p:cNvPr id="44" name="Oval 43">
             <a:extLst>
               <a:ext uri="{FF2B5EF4-FFF2-40B4-BE49-F238E27FC236}">
-                <a16:creationId xmlns:a16="http://schemas.microsoft.com/office/drawing/2014/main" xmlns="" id="{6FE7B31D-DB2A-48DD-958B-4CFB9B38DB8F}"/>
+                <a16:creationId xmlns:a16="http://schemas.microsoft.com/office/drawing/2014/main" id="{6FE7B31D-DB2A-48DD-958B-4CFB9B38DB8F}"/>
               </a:ext>
             </a:extLst>
           </p:cNvPr>
@@ -4555,7 +4566,7 @@
           <p:cNvPr id="45" name="Straight Arrow Connector 44">
             <a:extLst>
               <a:ext uri="{FF2B5EF4-FFF2-40B4-BE49-F238E27FC236}">
-                <a16:creationId xmlns:a16="http://schemas.microsoft.com/office/drawing/2014/main" xmlns="" id="{8B2A4EDC-C4CA-4646-95A1-B639B42E48F0}"/>
+                <a16:creationId xmlns:a16="http://schemas.microsoft.com/office/drawing/2014/main" id="{8B2A4EDC-C4CA-4646-95A1-B639B42E48F0}"/>
               </a:ext>
             </a:extLst>
           </p:cNvPr>
@@ -4604,7 +4615,7 @@
           <p:cNvPr id="46" name="Straight Arrow Connector 45">
             <a:extLst>
               <a:ext uri="{FF2B5EF4-FFF2-40B4-BE49-F238E27FC236}">
-                <a16:creationId xmlns:a16="http://schemas.microsoft.com/office/drawing/2014/main" xmlns="" id="{7D4CA50E-B7EB-4C6A-B434-BE49D162853D}"/>
+                <a16:creationId xmlns:a16="http://schemas.microsoft.com/office/drawing/2014/main" id="{7D4CA50E-B7EB-4C6A-B434-BE49D162853D}"/>
               </a:ext>
             </a:extLst>
           </p:cNvPr>
@@ -4652,7 +4663,7 @@
           <p:cNvPr id="49" name="Straight Arrow Connector 48">
             <a:extLst>
               <a:ext uri="{FF2B5EF4-FFF2-40B4-BE49-F238E27FC236}">
-                <a16:creationId xmlns:a16="http://schemas.microsoft.com/office/drawing/2014/main" xmlns="" id="{BF53725A-5CBD-43A6-9028-90F38BD84F26}"/>
+                <a16:creationId xmlns:a16="http://schemas.microsoft.com/office/drawing/2014/main" id="{BF53725A-5CBD-43A6-9028-90F38BD84F26}"/>
               </a:ext>
             </a:extLst>
           </p:cNvPr>
@@ -4701,7 +4712,7 @@
           <p:cNvPr id="50" name="Oval 49">
             <a:extLst>
               <a:ext uri="{FF2B5EF4-FFF2-40B4-BE49-F238E27FC236}">
-                <a16:creationId xmlns:a16="http://schemas.microsoft.com/office/drawing/2014/main" xmlns="" id="{93BF539E-7B4C-417B-879A-91B68D97720B}"/>
+                <a16:creationId xmlns:a16="http://schemas.microsoft.com/office/drawing/2014/main" id="{93BF539E-7B4C-417B-879A-91B68D97720B}"/>
               </a:ext>
             </a:extLst>
           </p:cNvPr>
@@ -4750,7 +4761,7 @@
           <p:cNvPr id="51" name="Oval 50">
             <a:extLst>
               <a:ext uri="{FF2B5EF4-FFF2-40B4-BE49-F238E27FC236}">
-                <a16:creationId xmlns:a16="http://schemas.microsoft.com/office/drawing/2014/main" xmlns="" id="{08624274-B072-4493-BDDA-4F92C8399F5E}"/>
+                <a16:creationId xmlns:a16="http://schemas.microsoft.com/office/drawing/2014/main" id="{08624274-B072-4493-BDDA-4F92C8399F5E}"/>
               </a:ext>
             </a:extLst>
           </p:cNvPr>
@@ -4799,7 +4810,7 @@
           <p:cNvPr id="52" name="Straight Arrow Connector 51">
             <a:extLst>
               <a:ext uri="{FF2B5EF4-FFF2-40B4-BE49-F238E27FC236}">
-                <a16:creationId xmlns:a16="http://schemas.microsoft.com/office/drawing/2014/main" xmlns="" id="{500806B9-205F-4F04-AA12-41318E5FF8EE}"/>
+                <a16:creationId xmlns:a16="http://schemas.microsoft.com/office/drawing/2014/main" id="{500806B9-205F-4F04-AA12-41318E5FF8EE}"/>
               </a:ext>
             </a:extLst>
           </p:cNvPr>
@@ -4848,7 +4859,7 @@
           <p:cNvPr id="53" name="Straight Arrow Connector 52">
             <a:extLst>
               <a:ext uri="{FF2B5EF4-FFF2-40B4-BE49-F238E27FC236}">
-                <a16:creationId xmlns:a16="http://schemas.microsoft.com/office/drawing/2014/main" xmlns="" id="{7709279C-7291-492C-B1EC-25C628D4EB46}"/>
+                <a16:creationId xmlns:a16="http://schemas.microsoft.com/office/drawing/2014/main" id="{7709279C-7291-492C-B1EC-25C628D4EB46}"/>
               </a:ext>
             </a:extLst>
           </p:cNvPr>
@@ -4897,7 +4908,7 @@
           <p:cNvPr id="54" name="Oval 53">
             <a:extLst>
               <a:ext uri="{FF2B5EF4-FFF2-40B4-BE49-F238E27FC236}">
-                <a16:creationId xmlns:a16="http://schemas.microsoft.com/office/drawing/2014/main" xmlns="" id="{2BE2494E-4C57-40BB-A6CE-D113984AAE6E}"/>
+                <a16:creationId xmlns:a16="http://schemas.microsoft.com/office/drawing/2014/main" id="{2BE2494E-4C57-40BB-A6CE-D113984AAE6E}"/>
               </a:ext>
             </a:extLst>
           </p:cNvPr>
@@ -4946,7 +4957,7 @@
           <p:cNvPr id="55" name="Straight Arrow Connector 54">
             <a:extLst>
               <a:ext uri="{FF2B5EF4-FFF2-40B4-BE49-F238E27FC236}">
-                <a16:creationId xmlns:a16="http://schemas.microsoft.com/office/drawing/2014/main" xmlns="" id="{8B349792-5AD4-49DF-BE39-09733F3B7636}"/>
+                <a16:creationId xmlns:a16="http://schemas.microsoft.com/office/drawing/2014/main" id="{8B349792-5AD4-49DF-BE39-09733F3B7636}"/>
               </a:ext>
             </a:extLst>
           </p:cNvPr>
@@ -4995,7 +5006,7 @@
           <p:cNvPr id="60" name="Arrow: Curved Down 59">
             <a:extLst>
               <a:ext uri="{FF2B5EF4-FFF2-40B4-BE49-F238E27FC236}">
-                <a16:creationId xmlns:a16="http://schemas.microsoft.com/office/drawing/2014/main" xmlns="" id="{DEF087DC-372F-43A2-B769-6A434846C050}"/>
+                <a16:creationId xmlns:a16="http://schemas.microsoft.com/office/drawing/2014/main" id="{DEF087DC-372F-43A2-B769-6A434846C050}"/>
               </a:ext>
             </a:extLst>
           </p:cNvPr>
@@ -5048,7 +5059,7 @@
           <p:cNvPr id="61" name="TextBox 60">
             <a:extLst>
               <a:ext uri="{FF2B5EF4-FFF2-40B4-BE49-F238E27FC236}">
-                <a16:creationId xmlns:a16="http://schemas.microsoft.com/office/drawing/2014/main" xmlns="" id="{E19F51BE-716A-4162-80B6-3D3629BED4EA}"/>
+                <a16:creationId xmlns:a16="http://schemas.microsoft.com/office/drawing/2014/main" id="{E19F51BE-716A-4162-80B6-3D3629BED4EA}"/>
               </a:ext>
             </a:extLst>
           </p:cNvPr>
@@ -5081,7 +5092,7 @@
     </p:spTree>
     <p:extLst>
       <p:ext uri="{BB962C8B-B14F-4D97-AF65-F5344CB8AC3E}">
-        <p14:creationId xmlns:p14="http://schemas.microsoft.com/office/powerpoint/2010/main" xmlns="" val="2677011651"/>
+        <p14:creationId xmlns:p14="http://schemas.microsoft.com/office/powerpoint/2010/main" val="2677011651"/>
       </p:ext>
     </p:extLst>
   </p:cSld>
@@ -5168,7 +5179,7 @@
     </p:spTree>
     <p:extLst>
       <p:ext uri="{BB962C8B-B14F-4D97-AF65-F5344CB8AC3E}">
-        <p14:creationId xmlns:p14="http://schemas.microsoft.com/office/powerpoint/2010/main" xmlns="" val="963109394"/>
+        <p14:creationId xmlns:p14="http://schemas.microsoft.com/office/powerpoint/2010/main" val="963109394"/>
       </p:ext>
     </p:extLst>
   </p:cSld>
@@ -5279,7 +5290,7 @@
     </p:spTree>
     <p:extLst>
       <p:ext uri="{BB962C8B-B14F-4D97-AF65-F5344CB8AC3E}">
-        <p14:creationId xmlns:p14="http://schemas.microsoft.com/office/powerpoint/2010/main" xmlns="" val="1329443712"/>
+        <p14:creationId xmlns:p14="http://schemas.microsoft.com/office/powerpoint/2010/main" val="1329443712"/>
       </p:ext>
     </p:extLst>
   </p:cSld>
@@ -5429,7 +5440,7 @@
     </p:spTree>
     <p:extLst>
       <p:ext uri="{BB962C8B-B14F-4D97-AF65-F5344CB8AC3E}">
-        <p14:creationId xmlns:p14="http://schemas.microsoft.com/office/powerpoint/2010/main" xmlns="" val="2046456680"/>
+        <p14:creationId xmlns:p14="http://schemas.microsoft.com/office/powerpoint/2010/main" val="2046456680"/>
       </p:ext>
     </p:extLst>
   </p:cSld>
@@ -5551,7 +5562,7 @@
     </p:spTree>
     <p:extLst>
       <p:ext uri="{BB962C8B-B14F-4D97-AF65-F5344CB8AC3E}">
-        <p14:creationId xmlns:p14="http://schemas.microsoft.com/office/powerpoint/2010/main" xmlns="" val="2359583069"/>
+        <p14:creationId xmlns:p14="http://schemas.microsoft.com/office/powerpoint/2010/main" val="2359583069"/>
       </p:ext>
     </p:extLst>
   </p:cSld>
@@ -5707,15 +5718,7 @@
             </a:r>
             <a:r>
               <a:rPr lang="en-CA" sz="1800" dirty="0"/>
-              <a:t> </a:t>
-            </a:r>
-            <a:r>
-              <a:rPr lang="en-CA" sz="1800" dirty="0" smtClean="0"/>
-              <a:t>actually for </a:t>
-            </a:r>
-            <a:r>
-              <a:rPr lang="en-CA" sz="1800" dirty="0"/>
-              <a:t>a </a:t>
+              <a:t> actually for a </a:t>
             </a:r>
             <a:r>
               <a:rPr lang="en-CA" sz="1800" i="1" dirty="0"/>
@@ -5765,7 +5768,7 @@
     </p:spTree>
     <p:extLst>
       <p:ext uri="{BB962C8B-B14F-4D97-AF65-F5344CB8AC3E}">
-        <p14:creationId xmlns:p14="http://schemas.microsoft.com/office/powerpoint/2010/main" xmlns="" val="1612823702"/>
+        <p14:creationId xmlns:p14="http://schemas.microsoft.com/office/powerpoint/2010/main" val="1612823702"/>
       </p:ext>
     </p:extLst>
   </p:cSld>
@@ -5946,7 +5949,7 @@
     </p:spTree>
     <p:extLst>
       <p:ext uri="{BB962C8B-B14F-4D97-AF65-F5344CB8AC3E}">
-        <p14:creationId xmlns:p14="http://schemas.microsoft.com/office/powerpoint/2010/main" xmlns="" val="2918540381"/>
+        <p14:creationId xmlns:p14="http://schemas.microsoft.com/office/powerpoint/2010/main" val="2918540381"/>
       </p:ext>
     </p:extLst>
   </p:cSld>
@@ -6113,7 +6116,7 @@
             <a:hlinkClick r:id="rId2"/>
             <a:extLst>
               <a:ext uri="{FF2B5EF4-FFF2-40B4-BE49-F238E27FC236}">
-                <a16:creationId xmlns:a16="http://schemas.microsoft.com/office/drawing/2014/main" xmlns="" id="{B09029AC-11B5-578D-1CE4-5FBA28820616}"/>
+                <a16:creationId xmlns:a16="http://schemas.microsoft.com/office/drawing/2014/main" id="{B09029AC-11B5-578D-1CE4-5FBA28820616}"/>
               </a:ext>
             </a:extLst>
           </p:cNvPr>
@@ -6141,7 +6144,7 @@
     </p:spTree>
     <p:extLst>
       <p:ext uri="{BB962C8B-B14F-4D97-AF65-F5344CB8AC3E}">
-        <p14:creationId xmlns:p14="http://schemas.microsoft.com/office/powerpoint/2010/main" xmlns="" val="2082079529"/>
+        <p14:creationId xmlns:p14="http://schemas.microsoft.com/office/powerpoint/2010/main" val="2082079529"/>
       </p:ext>
     </p:extLst>
   </p:cSld>
@@ -6245,7 +6248,7 @@
             <a:hlinkClick r:id="rId2"/>
             <a:extLst>
               <a:ext uri="{FF2B5EF4-FFF2-40B4-BE49-F238E27FC236}">
-                <a16:creationId xmlns:a16="http://schemas.microsoft.com/office/drawing/2014/main" xmlns="" id="{88B8EF2D-FFB1-46D5-8A69-3FFABB59DB4C}"/>
+                <a16:creationId xmlns:a16="http://schemas.microsoft.com/office/drawing/2014/main" id="{88B8EF2D-FFB1-46D5-8A69-3FFABB59DB4C}"/>
               </a:ext>
             </a:extLst>
           </p:cNvPr>
@@ -6275,7 +6278,7 @@
           <p:cNvPr id="9" name="TextBox 8">
             <a:extLst>
               <a:ext uri="{FF2B5EF4-FFF2-40B4-BE49-F238E27FC236}">
-                <a16:creationId xmlns:a16="http://schemas.microsoft.com/office/drawing/2014/main" xmlns="" id="{786CC83F-18D3-4AC7-824F-0F87F66B5C93}"/>
+                <a16:creationId xmlns:a16="http://schemas.microsoft.com/office/drawing/2014/main" id="{786CC83F-18D3-4AC7-824F-0F87F66B5C93}"/>
               </a:ext>
             </a:extLst>
           </p:cNvPr>
@@ -6322,7 +6325,7 @@
           <p:cNvPr id="10" name="TextBox 9">
             <a:extLst>
               <a:ext uri="{FF2B5EF4-FFF2-40B4-BE49-F238E27FC236}">
-                <a16:creationId xmlns:a16="http://schemas.microsoft.com/office/drawing/2014/main" xmlns="" id="{A41D0A6E-7271-44DE-BBDA-6421947A1081}"/>
+                <a16:creationId xmlns:a16="http://schemas.microsoft.com/office/drawing/2014/main" id="{A41D0A6E-7271-44DE-BBDA-6421947A1081}"/>
               </a:ext>
             </a:extLst>
           </p:cNvPr>
@@ -6361,7 +6364,7 @@
           <p:cNvPr id="11" name="TextBox 10">
             <a:extLst>
               <a:ext uri="{FF2B5EF4-FFF2-40B4-BE49-F238E27FC236}">
-                <a16:creationId xmlns:a16="http://schemas.microsoft.com/office/drawing/2014/main" xmlns="" id="{6D3861BB-B136-4796-B5F8-064DE202D762}"/>
+                <a16:creationId xmlns:a16="http://schemas.microsoft.com/office/drawing/2014/main" id="{6D3861BB-B136-4796-B5F8-064DE202D762}"/>
               </a:ext>
             </a:extLst>
           </p:cNvPr>
@@ -6406,7 +6409,7 @@
     </p:spTree>
     <p:extLst>
       <p:ext uri="{BB962C8B-B14F-4D97-AF65-F5344CB8AC3E}">
-        <p14:creationId xmlns:p14="http://schemas.microsoft.com/office/powerpoint/2010/main" xmlns="" val="3900843298"/>
+        <p14:creationId xmlns:p14="http://schemas.microsoft.com/office/powerpoint/2010/main" val="3900843298"/>
       </p:ext>
     </p:extLst>
   </p:cSld>
@@ -6547,7 +6550,7 @@
     </p:spTree>
     <p:extLst>
       <p:ext uri="{BB962C8B-B14F-4D97-AF65-F5344CB8AC3E}">
-        <p14:creationId xmlns:p14="http://schemas.microsoft.com/office/powerpoint/2010/main" xmlns="" val="4042104353"/>
+        <p14:creationId xmlns:p14="http://schemas.microsoft.com/office/powerpoint/2010/main" val="4042104353"/>
       </p:ext>
     </p:extLst>
   </p:cSld>
@@ -6763,7 +6766,7 @@
     </p:spTree>
     <p:extLst>
       <p:ext uri="{BB962C8B-B14F-4D97-AF65-F5344CB8AC3E}">
-        <p14:creationId xmlns:p14="http://schemas.microsoft.com/office/powerpoint/2010/main" xmlns="" val="2102850860"/>
+        <p14:creationId xmlns:p14="http://schemas.microsoft.com/office/powerpoint/2010/main" val="2102850860"/>
       </p:ext>
     </p:extLst>
   </p:cSld>
@@ -6974,10 +6977,59 @@
           </a:prstGeom>
         </p:spPr>
       </p:pic>
+      <p:sp>
+        <p:nvSpPr>
+          <p:cNvPr id="8" name="Rectangle 7">
+            <a:extLst>
+              <a:ext uri="{FF2B5EF4-FFF2-40B4-BE49-F238E27FC236}">
+                <a16:creationId xmlns:a16="http://schemas.microsoft.com/office/drawing/2014/main" id="{35126826-00E0-5A66-12EA-A617F86E45CB}"/>
+              </a:ext>
+            </a:extLst>
+          </p:cNvPr>
+          <p:cNvSpPr/>
+          <p:nvPr/>
+        </p:nvSpPr>
+        <p:spPr>
+          <a:xfrm>
+            <a:off x="8465814" y="4800575"/>
+            <a:ext cx="2131504" cy="621391"/>
+          </a:xfrm>
+          <a:prstGeom prst="rect">
+            <a:avLst/>
+          </a:prstGeom>
+        </p:spPr>
+        <p:style>
+          <a:lnRef idx="2">
+            <a:schemeClr val="accent1">
+              <a:shade val="15000"/>
+            </a:schemeClr>
+          </a:lnRef>
+          <a:fillRef idx="1">
+            <a:schemeClr val="accent1"/>
+          </a:fillRef>
+          <a:effectRef idx="0">
+            <a:schemeClr val="accent1"/>
+          </a:effectRef>
+          <a:fontRef idx="minor">
+            <a:schemeClr val="lt1"/>
+          </a:fontRef>
+        </p:style>
+        <p:txBody>
+          <a:bodyPr rtlCol="0" anchor="ctr"/>
+          <a:lstStyle/>
+          <a:p>
+            <a:pPr algn="ctr"/>
+            <a:r>
+              <a:rPr lang="en-CA" sz="2400" dirty="0"/>
+              <a:t>4, 5, 2, 1, 6, 7, 3</a:t>
+            </a:r>
+          </a:p>
+        </p:txBody>
+      </p:sp>
     </p:spTree>
     <p:extLst>
       <p:ext uri="{BB962C8B-B14F-4D97-AF65-F5344CB8AC3E}">
-        <p14:creationId xmlns:p14="http://schemas.microsoft.com/office/powerpoint/2010/main" xmlns="" val="4268241491"/>
+        <p14:creationId xmlns:p14="http://schemas.microsoft.com/office/powerpoint/2010/main" val="4268241491"/>
       </p:ext>
     </p:extLst>
   </p:cSld>
@@ -7162,7 +7214,7 @@
     </p:spTree>
     <p:extLst>
       <p:ext uri="{BB962C8B-B14F-4D97-AF65-F5344CB8AC3E}">
-        <p14:creationId xmlns:p14="http://schemas.microsoft.com/office/powerpoint/2010/main" xmlns="" val="2067780420"/>
+        <p14:creationId xmlns:p14="http://schemas.microsoft.com/office/powerpoint/2010/main" val="2067780420"/>
       </p:ext>
     </p:extLst>
   </p:cSld>
@@ -7339,7 +7391,7 @@
     </p:spTree>
     <p:extLst>
       <p:ext uri="{BB962C8B-B14F-4D97-AF65-F5344CB8AC3E}">
-        <p14:creationId xmlns:p14="http://schemas.microsoft.com/office/powerpoint/2010/main" xmlns="" val="729498125"/>
+        <p14:creationId xmlns:p14="http://schemas.microsoft.com/office/powerpoint/2010/main" val="729498125"/>
       </p:ext>
     </p:extLst>
   </p:cSld>
@@ -7499,7 +7551,7 @@
     </p:spTree>
     <p:extLst>
       <p:ext uri="{BB962C8B-B14F-4D97-AF65-F5344CB8AC3E}">
-        <p14:creationId xmlns:p14="http://schemas.microsoft.com/office/powerpoint/2010/main" xmlns="" val="2015340042"/>
+        <p14:creationId xmlns:p14="http://schemas.microsoft.com/office/powerpoint/2010/main" val="2015340042"/>
       </p:ext>
     </p:extLst>
   </p:cSld>
@@ -7620,7 +7672,7 @@
     </p:spTree>
     <p:extLst>
       <p:ext uri="{BB962C8B-B14F-4D97-AF65-F5344CB8AC3E}">
-        <p14:creationId xmlns:p14="http://schemas.microsoft.com/office/powerpoint/2010/main" xmlns="" val="1289681004"/>
+        <p14:creationId xmlns:p14="http://schemas.microsoft.com/office/powerpoint/2010/main" val="1289681004"/>
       </p:ext>
     </p:extLst>
   </p:cSld>
@@ -7707,7 +7759,7 @@
     </p:spTree>
     <p:extLst>
       <p:ext uri="{BB962C8B-B14F-4D97-AF65-F5344CB8AC3E}">
-        <p14:creationId xmlns:p14="http://schemas.microsoft.com/office/powerpoint/2010/main" xmlns="" val="1389926418"/>
+        <p14:creationId xmlns:p14="http://schemas.microsoft.com/office/powerpoint/2010/main" val="1389926418"/>
       </p:ext>
     </p:extLst>
   </p:cSld>
@@ -7739,7 +7791,7 @@
           <p:cNvPr id="2" name="Title 1">
             <a:extLst>
               <a:ext uri="{FF2B5EF4-FFF2-40B4-BE49-F238E27FC236}">
-                <a16:creationId xmlns:a16="http://schemas.microsoft.com/office/drawing/2014/main" xmlns="" id="{FF817373-0FD4-4FA3-8A7A-9ED2AC00C4BA}"/>
+                <a16:creationId xmlns:a16="http://schemas.microsoft.com/office/drawing/2014/main" id="{FF817373-0FD4-4FA3-8A7A-9ED2AC00C4BA}"/>
               </a:ext>
             </a:extLst>
           </p:cNvPr>
@@ -7776,7 +7828,7 @@
           <p:cNvPr id="5" name="Slide Number Placeholder 4">
             <a:extLst>
               <a:ext uri="{FF2B5EF4-FFF2-40B4-BE49-F238E27FC236}">
-                <a16:creationId xmlns:a16="http://schemas.microsoft.com/office/drawing/2014/main" xmlns="" id="{8FA8E36E-018A-4C8A-A2C0-2F8982417450}"/>
+                <a16:creationId xmlns:a16="http://schemas.microsoft.com/office/drawing/2014/main" id="{8FA8E36E-018A-4C8A-A2C0-2F8982417450}"/>
               </a:ext>
             </a:extLst>
           </p:cNvPr>
@@ -7806,7 +7858,7 @@
           <p:cNvPr id="7" name="Picture 6">
             <a:extLst>
               <a:ext uri="{FF2B5EF4-FFF2-40B4-BE49-F238E27FC236}">
-                <a16:creationId xmlns:a16="http://schemas.microsoft.com/office/drawing/2014/main" xmlns="" id="{FB64F671-1254-4CDD-963B-97FD3887B574}"/>
+                <a16:creationId xmlns:a16="http://schemas.microsoft.com/office/drawing/2014/main" id="{FB64F671-1254-4CDD-963B-97FD3887B574}"/>
               </a:ext>
             </a:extLst>
           </p:cNvPr>
@@ -7836,7 +7888,7 @@
           <p:cNvPr id="11" name="TextBox 10">
             <a:extLst>
               <a:ext uri="{FF2B5EF4-FFF2-40B4-BE49-F238E27FC236}">
-                <a16:creationId xmlns:a16="http://schemas.microsoft.com/office/drawing/2014/main" xmlns="" id="{A49BAA51-5E23-4C55-995F-E6A26E2ACEC6}"/>
+                <a16:creationId xmlns:a16="http://schemas.microsoft.com/office/drawing/2014/main" id="{A49BAA51-5E23-4C55-995F-E6A26E2ACEC6}"/>
               </a:ext>
             </a:extLst>
           </p:cNvPr>
@@ -7880,7 +7932,7 @@
           <p:cNvPr id="12" name="Picture 11">
             <a:extLst>
               <a:ext uri="{FF2B5EF4-FFF2-40B4-BE49-F238E27FC236}">
-                <a16:creationId xmlns:a16="http://schemas.microsoft.com/office/drawing/2014/main" xmlns="" id="{993236AA-1E2C-4A96-9492-6C8F733F4350}"/>
+                <a16:creationId xmlns:a16="http://schemas.microsoft.com/office/drawing/2014/main" id="{993236AA-1E2C-4A96-9492-6C8F733F4350}"/>
               </a:ext>
             </a:extLst>
           </p:cNvPr>
@@ -7910,7 +7962,7 @@
           <p:cNvPr id="13" name="TextBox 12">
             <a:extLst>
               <a:ext uri="{FF2B5EF4-FFF2-40B4-BE49-F238E27FC236}">
-                <a16:creationId xmlns:a16="http://schemas.microsoft.com/office/drawing/2014/main" xmlns="" id="{206BAB43-C929-4650-BF05-59E8511280C3}"/>
+                <a16:creationId xmlns:a16="http://schemas.microsoft.com/office/drawing/2014/main" id="{206BAB43-C929-4650-BF05-59E8511280C3}"/>
               </a:ext>
             </a:extLst>
           </p:cNvPr>
@@ -7954,7 +8006,7 @@
           <p:cNvPr id="14" name="Picture 13">
             <a:extLst>
               <a:ext uri="{FF2B5EF4-FFF2-40B4-BE49-F238E27FC236}">
-                <a16:creationId xmlns:a16="http://schemas.microsoft.com/office/drawing/2014/main" xmlns="" id="{7599E383-0B5F-4FB2-9D2B-72FECDBAB1C7}"/>
+                <a16:creationId xmlns:a16="http://schemas.microsoft.com/office/drawing/2014/main" id="{7599E383-0B5F-4FB2-9D2B-72FECDBAB1C7}"/>
               </a:ext>
             </a:extLst>
           </p:cNvPr>
@@ -7984,7 +8036,7 @@
           <p:cNvPr id="15" name="TextBox 14">
             <a:extLst>
               <a:ext uri="{FF2B5EF4-FFF2-40B4-BE49-F238E27FC236}">
-                <a16:creationId xmlns:a16="http://schemas.microsoft.com/office/drawing/2014/main" xmlns="" id="{68D04806-923C-422A-9877-538136C9045B}"/>
+                <a16:creationId xmlns:a16="http://schemas.microsoft.com/office/drawing/2014/main" id="{68D04806-923C-422A-9877-538136C9045B}"/>
               </a:ext>
             </a:extLst>
           </p:cNvPr>
@@ -8028,7 +8080,7 @@
           <p:cNvPr id="16" name="Picture 15">
             <a:extLst>
               <a:ext uri="{FF2B5EF4-FFF2-40B4-BE49-F238E27FC236}">
-                <a16:creationId xmlns:a16="http://schemas.microsoft.com/office/drawing/2014/main" xmlns="" id="{EF2AC156-4FD7-466B-A233-2E854FBAC8C1}"/>
+                <a16:creationId xmlns:a16="http://schemas.microsoft.com/office/drawing/2014/main" id="{EF2AC156-4FD7-466B-A233-2E854FBAC8C1}"/>
               </a:ext>
             </a:extLst>
           </p:cNvPr>
@@ -8058,7 +8110,7 @@
           <p:cNvPr id="17" name="TextBox 16">
             <a:extLst>
               <a:ext uri="{FF2B5EF4-FFF2-40B4-BE49-F238E27FC236}">
-                <a16:creationId xmlns:a16="http://schemas.microsoft.com/office/drawing/2014/main" xmlns="" id="{46A43ADC-ECE3-4E56-9688-7950EE7C1A21}"/>
+                <a16:creationId xmlns:a16="http://schemas.microsoft.com/office/drawing/2014/main" id="{46A43ADC-ECE3-4E56-9688-7950EE7C1A21}"/>
               </a:ext>
             </a:extLst>
           </p:cNvPr>
@@ -8100,7 +8152,7 @@
     </p:spTree>
     <p:extLst>
       <p:ext uri="{BB962C8B-B14F-4D97-AF65-F5344CB8AC3E}">
-        <p14:creationId xmlns:p14="http://schemas.microsoft.com/office/powerpoint/2010/main" xmlns="" val="2829327773"/>
+        <p14:creationId xmlns:p14="http://schemas.microsoft.com/office/powerpoint/2010/main" val="2829327773"/>
       </p:ext>
     </p:extLst>
   </p:cSld>
@@ -8231,7 +8283,7 @@
     </p:spTree>
     <p:extLst>
       <p:ext uri="{BB962C8B-B14F-4D97-AF65-F5344CB8AC3E}">
-        <p14:creationId xmlns:p14="http://schemas.microsoft.com/office/powerpoint/2010/main" xmlns="" val="2551999390"/>
+        <p14:creationId xmlns:p14="http://schemas.microsoft.com/office/powerpoint/2010/main" val="2551999390"/>
       </p:ext>
     </p:extLst>
   </p:cSld>
@@ -8383,7 +8435,7 @@
     </p:spTree>
     <p:extLst>
       <p:ext uri="{BB962C8B-B14F-4D97-AF65-F5344CB8AC3E}">
-        <p14:creationId xmlns:p14="http://schemas.microsoft.com/office/powerpoint/2010/main" xmlns="" val="4015535247"/>
+        <p14:creationId xmlns:p14="http://schemas.microsoft.com/office/powerpoint/2010/main" val="4015535247"/>
       </p:ext>
     </p:extLst>
   </p:cSld>
@@ -8552,7 +8604,7 @@
     </p:spTree>
     <p:extLst>
       <p:ext uri="{BB962C8B-B14F-4D97-AF65-F5344CB8AC3E}">
-        <p14:creationId xmlns:p14="http://schemas.microsoft.com/office/powerpoint/2010/main" xmlns="" val="3889126053"/>
+        <p14:creationId xmlns:p14="http://schemas.microsoft.com/office/powerpoint/2010/main" val="3889126053"/>
       </p:ext>
     </p:extLst>
   </p:cSld>
@@ -8750,7 +8802,7 @@
     </p:spTree>
     <p:extLst>
       <p:ext uri="{BB962C8B-B14F-4D97-AF65-F5344CB8AC3E}">
-        <p14:creationId xmlns:p14="http://schemas.microsoft.com/office/powerpoint/2010/main" xmlns="" val="3305589402"/>
+        <p14:creationId xmlns:p14="http://schemas.microsoft.com/office/powerpoint/2010/main" val="3305589402"/>
       </p:ext>
     </p:extLst>
   </p:cSld>
@@ -8938,7 +8990,7 @@
     </p:spTree>
     <p:extLst>
       <p:ext uri="{BB962C8B-B14F-4D97-AF65-F5344CB8AC3E}">
-        <p14:creationId xmlns:p14="http://schemas.microsoft.com/office/powerpoint/2010/main" xmlns="" val="1452519649"/>
+        <p14:creationId xmlns:p14="http://schemas.microsoft.com/office/powerpoint/2010/main" val="1452519649"/>
       </p:ext>
     </p:extLst>
   </p:cSld>
@@ -9203,7 +9255,7 @@
   <a:extraClrSchemeLst/>
   <a:extLst>
     <a:ext uri="{05A4C25C-085E-4340-85A3-A5531E510DB2}">
-      <thm15:themeFamily xmlns:thm15="http://schemas.microsoft.com/office/thememl/2012/main" xmlns="" name="Office Theme" id="{62F939B6-93AF-4DB8-9C6B-D6C7DFDC589F}" vid="{4A3C46E8-61CC-4603-A589-7422A47A8E4A}"/>
+      <thm15:themeFamily xmlns:thm15="http://schemas.microsoft.com/office/thememl/2012/main" name="Office Theme" id="{62F939B6-93AF-4DB8-9C6B-D6C7DFDC589F}" vid="{4A3C46E8-61CC-4603-A589-7422A47A8E4A}"/>
     </a:ext>
   </a:extLst>
 </a:theme>
@@ -9464,7 +9516,7 @@
   <a:extraClrSchemeLst/>
   <a:extLst>
     <a:ext uri="{05A4C25C-085E-4340-85A3-A5531E510DB2}">
-      <thm15:themeFamily xmlns:thm15="http://schemas.microsoft.com/office/thememl/2012/main" xmlns="" name="Office Theme" id="{62F939B6-93AF-4DB8-9C6B-D6C7DFDC589F}" vid="{4A3C46E8-61CC-4603-A589-7422A47A8E4A}"/>
+      <thm15:themeFamily xmlns:thm15="http://schemas.microsoft.com/office/thememl/2012/main" name="Office Theme" id="{62F939B6-93AF-4DB8-9C6B-D6C7DFDC589F}" vid="{4A3C46E8-61CC-4603-A589-7422A47A8E4A}"/>
     </a:ext>
   </a:extLst>
 </a:theme>

</xml_diff>